<commit_message>
Signed-off-by: Tarek Chebbi <tc461294@win.zlw-ima.rwth-aachen.de>
</commit_message>
<xml_diff>
--- a/Präsentationen/Anfänger - Java mit NAO.pptx
+++ b/Präsentationen/Anfänger - Java mit NAO.pptx
@@ -258,7 +258,7 @@
           <a:p>
             <a:fld id="{CC55654B-D41D-4425-B58F-55C2DEAC0691}" type="datetimeFigureOut">
               <a:rPr lang="de-DE" smtClean="0"/>
-              <a:t>31.03.2017</a:t>
+              <a:t>07.04.2017</a:t>
             </a:fld>
             <a:endParaRPr lang="de-DE"/>
           </a:p>
@@ -4113,11 +4113,7 @@
             </a:r>
             <a:r>
               <a:rPr lang="de-DE" i="1" baseline="0" dirty="0" smtClean="0"/>
-              <a:t> den Anfänger-Kurs</a:t>
-            </a:r>
-            <a:r>
-              <a:rPr lang="de-DE" i="1" baseline="0" dirty="0" smtClean="0"/>
-              <a:t>.</a:t>
+              <a:t> den Anfänger-Kurs.</a:t>
             </a:r>
           </a:p>
           <a:p>
@@ -4125,7 +4121,6 @@
               <a:rPr lang="de-DE" i="1" baseline="0" dirty="0" smtClean="0"/>
               <a:t>Leider können die Kids keine Aufgaben mit NAO machen, bevor diese Themen abgehandelt sind. Danach wartet allerdings eine größere Aufgabe auf die Kids, welche den NAO mit einbezieht.</a:t>
             </a:r>
-            <a:endParaRPr lang="de-DE" i="1" baseline="0" dirty="0" smtClean="0"/>
           </a:p>
           <a:p>
             <a:r>
@@ -4269,6 +4264,12 @@
           <a:bodyPr/>
           <a:lstStyle/>
           <a:p>
+            <a:r>
+              <a:rPr lang="de-DE" i="0" u="none" baseline="0" dirty="0" smtClean="0">
+                <a:sym typeface="Wingdings" panose="05000000000000000000" pitchFamily="2" charset="2"/>
+              </a:rPr>
+              <a:t>Fakultät erklären, falls die Kids nicht wissen was die Fakultät ist</a:t>
+            </a:r>
             <a:endParaRPr lang="de-DE" i="0" u="none" baseline="0" dirty="0" smtClean="0">
               <a:sym typeface="Wingdings" panose="05000000000000000000" pitchFamily="2" charset="2"/>
             </a:endParaRPr>
@@ -5056,6 +5057,32 @@
           <a:bodyPr/>
           <a:lstStyle/>
           <a:p>
+            <a:r>
+              <a:rPr lang="de-DE" i="0" u="none" baseline="0" dirty="0" smtClean="0">
+                <a:sym typeface="Wingdings" panose="05000000000000000000" pitchFamily="2" charset="2"/>
+              </a:rPr>
+              <a:t>Ich hoffe spätestens hier kommt die Frage auf, warum denn das eine Plus addiert und das andere nicht.</a:t>
+            </a:r>
+          </a:p>
+          <a:p>
+            <a:r>
+              <a:rPr lang="de-DE" i="0" u="none" baseline="0" dirty="0" smtClean="0">
+                <a:sym typeface="Wingdings" panose="05000000000000000000" pitchFamily="2" charset="2"/>
+              </a:rPr>
+              <a:t>Plus bei einem String ist die „</a:t>
+            </a:r>
+            <a:r>
+              <a:rPr lang="de-DE" i="0" u="none" baseline="0" dirty="0" err="1" smtClean="0">
+                <a:sym typeface="Wingdings" panose="05000000000000000000" pitchFamily="2" charset="2"/>
+              </a:rPr>
+              <a:t>Konkatenation</a:t>
+            </a:r>
+            <a:r>
+              <a:rPr lang="de-DE" i="0" u="none" baseline="0" dirty="0" smtClean="0">
+                <a:sym typeface="Wingdings" panose="05000000000000000000" pitchFamily="2" charset="2"/>
+              </a:rPr>
+              <a:t>“, also das aneinanderhängen von zwei Strings.</a:t>
+            </a:r>
             <a:endParaRPr lang="de-DE" i="0" u="none" baseline="0" dirty="0" smtClean="0">
               <a:sym typeface="Wingdings" panose="05000000000000000000" pitchFamily="2" charset="2"/>
             </a:endParaRPr>
@@ -6191,7 +6218,7 @@
           <a:p>
             <a:fld id="{82DEAF87-53B6-4B16-83D2-2F0231427512}" type="datetimeFigureOut">
               <a:rPr lang="de-DE" smtClean="0"/>
-              <a:t>31.03.2017</a:t>
+              <a:t>07.04.2017</a:t>
             </a:fld>
             <a:endParaRPr lang="de-DE"/>
           </a:p>
@@ -6408,7 +6435,7 @@
           <a:p>
             <a:fld id="{82DEAF87-53B6-4B16-83D2-2F0231427512}" type="datetimeFigureOut">
               <a:rPr lang="de-DE" smtClean="0"/>
-              <a:t>31.03.2017</a:t>
+              <a:t>07.04.2017</a:t>
             </a:fld>
             <a:endParaRPr lang="de-DE"/>
           </a:p>
@@ -6618,7 +6645,7 @@
           <a:p>
             <a:fld id="{82DEAF87-53B6-4B16-83D2-2F0231427512}" type="datetimeFigureOut">
               <a:rPr lang="de-DE" smtClean="0"/>
-              <a:t>31.03.2017</a:t>
+              <a:t>07.04.2017</a:t>
             </a:fld>
             <a:endParaRPr lang="de-DE"/>
           </a:p>
@@ -6894,7 +6921,7 @@
           <a:p>
             <a:fld id="{82DEAF87-53B6-4B16-83D2-2F0231427512}" type="datetimeFigureOut">
               <a:rPr lang="de-DE" smtClean="0"/>
-              <a:t>31.03.2017</a:t>
+              <a:t>07.04.2017</a:t>
             </a:fld>
             <a:endParaRPr lang="de-DE"/>
           </a:p>
@@ -7177,7 +7204,7 @@
           <a:p>
             <a:fld id="{82DEAF87-53B6-4B16-83D2-2F0231427512}" type="datetimeFigureOut">
               <a:rPr lang="de-DE" smtClean="0"/>
-              <a:t>31.03.2017</a:t>
+              <a:t>07.04.2017</a:t>
             </a:fld>
             <a:endParaRPr lang="de-DE"/>
           </a:p>
@@ -7503,7 +7530,7 @@
           <a:p>
             <a:fld id="{82DEAF87-53B6-4B16-83D2-2F0231427512}" type="datetimeFigureOut">
               <a:rPr lang="de-DE" smtClean="0"/>
-              <a:t>31.03.2017</a:t>
+              <a:t>07.04.2017</a:t>
             </a:fld>
             <a:endParaRPr lang="de-DE"/>
           </a:p>
@@ -7969,7 +7996,7 @@
           <a:p>
             <a:fld id="{82DEAF87-53B6-4B16-83D2-2F0231427512}" type="datetimeFigureOut">
               <a:rPr lang="de-DE" smtClean="0"/>
-              <a:t>31.03.2017</a:t>
+              <a:t>07.04.2017</a:t>
             </a:fld>
             <a:endParaRPr lang="de-DE"/>
           </a:p>
@@ -8119,7 +8146,7 @@
           <a:p>
             <a:fld id="{82DEAF87-53B6-4B16-83D2-2F0231427512}" type="datetimeFigureOut">
               <a:rPr lang="de-DE" smtClean="0"/>
-              <a:t>31.03.2017</a:t>
+              <a:t>07.04.2017</a:t>
             </a:fld>
             <a:endParaRPr lang="de-DE"/>
           </a:p>
@@ -8238,7 +8265,7 @@
           <a:p>
             <a:fld id="{82DEAF87-53B6-4B16-83D2-2F0231427512}" type="datetimeFigureOut">
               <a:rPr lang="de-DE" smtClean="0"/>
-              <a:t>31.03.2017</a:t>
+              <a:t>07.04.2017</a:t>
             </a:fld>
             <a:endParaRPr lang="de-DE"/>
           </a:p>
@@ -8548,7 +8575,7 @@
           <a:p>
             <a:fld id="{82DEAF87-53B6-4B16-83D2-2F0231427512}" type="datetimeFigureOut">
               <a:rPr lang="de-DE" smtClean="0"/>
-              <a:t>31.03.2017</a:t>
+              <a:t>07.04.2017</a:t>
             </a:fld>
             <a:endParaRPr lang="de-DE"/>
           </a:p>
@@ -8834,7 +8861,7 @@
           <a:p>
             <a:fld id="{82DEAF87-53B6-4B16-83D2-2F0231427512}" type="datetimeFigureOut">
               <a:rPr lang="de-DE" smtClean="0"/>
-              <a:t>31.03.2017</a:t>
+              <a:t>07.04.2017</a:t>
             </a:fld>
             <a:endParaRPr lang="de-DE"/>
           </a:p>
@@ -13722,7 +13749,23 @@
                   <a:srgbClr val="831420"/>
                 </a:solidFill>
               </a:rPr>
-              <a:t>Aufgabe: Rechnen                                   [1]</a:t>
+              <a:t>Aufgabe: </a:t>
+            </a:r>
+            <a:r>
+              <a:rPr lang="de-DE" dirty="0" smtClean="0">
+                <a:solidFill>
+                  <a:srgbClr val="831420"/>
+                </a:solidFill>
+              </a:rPr>
+              <a:t>Simples Rechnen                    </a:t>
+            </a:r>
+            <a:r>
+              <a:rPr lang="de-DE" dirty="0" smtClean="0">
+                <a:solidFill>
+                  <a:srgbClr val="831420"/>
+                </a:solidFill>
+              </a:rPr>
+              <a:t>[1]</a:t>
             </a:r>
             <a:endParaRPr lang="de-DE" dirty="0">
               <a:solidFill>
@@ -22308,7 +22351,15 @@
                   <a:srgbClr val="831420"/>
                 </a:solidFill>
               </a:rPr>
-              <a:t>[4]</a:t>
+              <a:t>Einfache Mathematik?          [4</a:t>
+            </a:r>
+            <a:r>
+              <a:rPr lang="de-DE" dirty="0" smtClean="0">
+                <a:solidFill>
+                  <a:srgbClr val="831420"/>
+                </a:solidFill>
+              </a:rPr>
+              <a:t>]</a:t>
             </a:r>
             <a:endParaRPr lang="de-DE" dirty="0">
               <a:solidFill>
@@ -22341,6 +22392,123 @@
           <a:bodyPr anchor="t"/>
           <a:lstStyle/>
           <a:p>
+            <a:r>
+              <a:rPr lang="de-DE" sz="2000" dirty="0" smtClean="0"/>
+              <a:t>Erstellt eine neue Klasse mit dem Namen </a:t>
+            </a:r>
+            <a:r>
+              <a:rPr lang="de-DE" sz="2000" dirty="0" err="1" smtClean="0"/>
+              <a:t>EasyMath</a:t>
+            </a:r>
+            <a:r>
+              <a:rPr lang="de-DE" sz="2000" dirty="0" smtClean="0"/>
+              <a:t> im </a:t>
+            </a:r>
+            <a:r>
+              <a:rPr lang="de-DE" sz="2000" dirty="0" err="1" smtClean="0"/>
+              <a:t>src</a:t>
+            </a:r>
+            <a:r>
+              <a:rPr lang="de-DE" sz="2000" dirty="0" smtClean="0"/>
+              <a:t>-Ordner der vierten Aufgabe</a:t>
+            </a:r>
+          </a:p>
+          <a:p>
+            <a:r>
+              <a:rPr lang="de-DE" sz="2000" dirty="0" smtClean="0"/>
+              <a:t>In der Klasse „Main“ findet ihr die main-Methode, in welcher ihr ein</a:t>
+            </a:r>
+            <a:r>
+              <a:rPr lang="de-DE" sz="2000" dirty="0"/>
+              <a:t/>
+            </a:r>
+            <a:br>
+              <a:rPr lang="de-DE" sz="2000" dirty="0"/>
+            </a:br>
+            <a:r>
+              <a:rPr lang="de-DE" sz="2000" dirty="0" smtClean="0"/>
+              <a:t>neues Objekt eurer Klasse erzeugen sollt.</a:t>
+            </a:r>
+          </a:p>
+          <a:p>
+            <a:r>
+              <a:rPr lang="de-DE" sz="2000" dirty="0" smtClean="0"/>
+              <a:t>Implementiert die folgenden Methoden:</a:t>
+            </a:r>
+          </a:p>
+          <a:p>
+            <a:pPr marL="800100" lvl="1" indent="-342900">
+              <a:buFont typeface="+mj-lt"/>
+              <a:buAutoNum type="alphaLcPeriod"/>
+            </a:pPr>
+            <a:endParaRPr lang="de-DE" sz="1600" dirty="0" smtClean="0"/>
+          </a:p>
+          <a:p>
+            <a:pPr marL="800100" lvl="1" indent="-342900">
+              <a:buFont typeface="+mj-lt"/>
+              <a:buAutoNum type="alphaLcPeriod"/>
+            </a:pPr>
+            <a:r>
+              <a:rPr lang="de-DE" sz="1600" dirty="0" smtClean="0"/>
+              <a:t>„</a:t>
+            </a:r>
+            <a:r>
+              <a:rPr lang="de-DE" sz="1600" dirty="0" err="1" smtClean="0"/>
+              <a:t>factorial</a:t>
+            </a:r>
+            <a:r>
+              <a:rPr lang="de-DE" sz="1600" dirty="0" smtClean="0"/>
+              <a:t>“	Akzeptiert eine Ganzzahl als Parameter und gibt die Fakultät der Zahl zurück</a:t>
+            </a:r>
+          </a:p>
+          <a:p>
+            <a:pPr marL="800100" lvl="1" indent="-342900">
+              <a:buFont typeface="+mj-lt"/>
+              <a:buAutoNum type="alphaLcPeriod"/>
+            </a:pPr>
+            <a:r>
+              <a:rPr lang="de-DE" sz="1600" dirty="0" smtClean="0"/>
+              <a:t>„</a:t>
+            </a:r>
+            <a:r>
+              <a:rPr lang="de-DE" sz="1600" dirty="0" err="1" smtClean="0"/>
+              <a:t>modulo</a:t>
+            </a:r>
+            <a:r>
+              <a:rPr lang="de-DE" sz="1600" dirty="0" smtClean="0"/>
+              <a:t>“	Akzeptiert zwei Ganzzahlen als Parameter und gibt den Rest der Division 			zurück, der entsteht, wenn man den ersten durch den zweiten Parameter teilt</a:t>
+            </a:r>
+          </a:p>
+          <a:p>
+            <a:pPr marL="800100" lvl="1" indent="-342900">
+              <a:buFont typeface="+mj-lt"/>
+              <a:buAutoNum type="alphaLcPeriod"/>
+            </a:pPr>
+            <a:r>
+              <a:rPr lang="de-DE" sz="1600" dirty="0" smtClean="0"/>
+              <a:t>„</a:t>
+            </a:r>
+            <a:r>
+              <a:rPr lang="de-DE" sz="1600" dirty="0" err="1" smtClean="0"/>
+              <a:t>gcd</a:t>
+            </a:r>
+            <a:r>
+              <a:rPr lang="de-DE" sz="1600" dirty="0" smtClean="0"/>
+              <a:t>“	Akzeptiert zwei Ganzzahlen als Parameter und gibt den größten gemeinsamen 		Teiler der beiden Zahlen zurück</a:t>
+            </a:r>
+            <a:endParaRPr lang="de-DE" sz="2000" dirty="0" smtClean="0"/>
+          </a:p>
+          <a:p>
+            <a:r>
+              <a:rPr lang="de-DE" sz="2000" dirty="0" smtClean="0"/>
+              <a:t>In der main-Methode könnt ihr eure Methoden testen und die Resultate in der Konsole ausgeben</a:t>
+            </a:r>
+          </a:p>
+          <a:p>
+            <a:pPr marL="457200" indent="-457200">
+              <a:buFont typeface="+mj-lt"/>
+              <a:buAutoNum type="alphaLcPeriod"/>
+            </a:pPr>
             <a:endParaRPr lang="de-DE" sz="2000" dirty="0" smtClean="0"/>
           </a:p>
         </p:txBody>
@@ -23877,11 +24045,7 @@
             </a:r>
             <a:r>
               <a:rPr lang="de-DE" sz="1600" dirty="0" smtClean="0"/>
-              <a:t> </a:t>
-            </a:r>
-            <a:r>
-              <a:rPr lang="de-DE" sz="1600" dirty="0" smtClean="0"/>
-              <a:t>über Objektinitialisierung</a:t>
+              <a:t> über Objektinitialisierung</a:t>
             </a:r>
           </a:p>
           <a:p>
@@ -23902,11 +24066,7 @@
             </a:r>
             <a:r>
               <a:rPr lang="de-DE" sz="1600" dirty="0" smtClean="0"/>
-              <a:t> </a:t>
-            </a:r>
-            <a:r>
-              <a:rPr lang="de-DE" sz="1600" dirty="0" smtClean="0"/>
-              <a:t>über Arrayinitialisierung</a:t>
+              <a:t> über Arrayinitialisierung</a:t>
             </a:r>
           </a:p>
           <a:p>
@@ -24709,8 +24869,36 @@
           <a:p>
             <a:r>
               <a:rPr lang="de-DE" sz="2000" dirty="0" smtClean="0"/>
-              <a:t>Wir können wieder durch Angabe des Index genauso aus dem Array lesen</a:t>
-            </a:r>
+              <a:t>Wir können </a:t>
+            </a:r>
+            <a:r>
+              <a:rPr lang="de-DE" sz="2000" dirty="0" smtClean="0"/>
+              <a:t>durch </a:t>
+            </a:r>
+            <a:r>
+              <a:rPr lang="de-DE" sz="2000" dirty="0" smtClean="0"/>
+              <a:t>Angabe des Index </a:t>
+            </a:r>
+            <a:r>
+              <a:rPr lang="de-DE" sz="2000" dirty="0" smtClean="0"/>
+              <a:t>in eckigen Klammern</a:t>
+            </a:r>
+            <a:br>
+              <a:rPr lang="de-DE" sz="2000" dirty="0" smtClean="0"/>
+            </a:br>
+            <a:r>
+              <a:rPr lang="de-DE" sz="2000" dirty="0" smtClean="0"/>
+              <a:t>genauso </a:t>
+            </a:r>
+            <a:r>
+              <a:rPr lang="de-DE" sz="2000" dirty="0" smtClean="0"/>
+              <a:t>aus dem Array </a:t>
+            </a:r>
+            <a:r>
+              <a:rPr lang="de-DE" sz="2000" dirty="0" smtClean="0"/>
+              <a:t>lesen, wie wir in es schreiben können</a:t>
+            </a:r>
+            <a:endParaRPr lang="de-DE" sz="2000" dirty="0" smtClean="0"/>
           </a:p>
         </p:txBody>
       </p:sp>
@@ -25656,7 +25844,15 @@
                   <a:srgbClr val="831420"/>
                 </a:solidFill>
               </a:rPr>
-              <a:t>[5]</a:t>
+              <a:t>Schwierige Mathematik?      [5</a:t>
+            </a:r>
+            <a:r>
+              <a:rPr lang="de-DE" dirty="0" smtClean="0">
+                <a:solidFill>
+                  <a:srgbClr val="831420"/>
+                </a:solidFill>
+              </a:rPr>
+              <a:t>]</a:t>
             </a:r>
             <a:endParaRPr lang="de-DE" dirty="0">
               <a:solidFill>
@@ -25689,7 +25885,88 @@
           <a:bodyPr anchor="t"/>
           <a:lstStyle/>
           <a:p>
-            <a:endParaRPr lang="de-DE" sz="2000" dirty="0" smtClean="0"/>
+            <a:r>
+              <a:rPr lang="de-DE" sz="2000" dirty="0" smtClean="0"/>
+              <a:t>Verbessert eure Mathematik-Klasse aus Aufgabe 4!</a:t>
+            </a:r>
+          </a:p>
+          <a:p>
+            <a:r>
+              <a:rPr lang="de-DE" sz="2000" dirty="0" smtClean="0"/>
+              <a:t>Folgende Methoden müsst ihr implementieren:</a:t>
+            </a:r>
+          </a:p>
+          <a:p>
+            <a:pPr marL="800100" lvl="1" indent="-342900">
+              <a:buFont typeface="+mj-lt"/>
+              <a:buAutoNum type="alphaLcPeriod"/>
+            </a:pPr>
+            <a:endParaRPr lang="de-DE" sz="1600" dirty="0" smtClean="0"/>
+          </a:p>
+          <a:p>
+            <a:pPr marL="800100" lvl="1" indent="-342900">
+              <a:buFont typeface="+mj-lt"/>
+              <a:buAutoNum type="alphaLcPeriod"/>
+            </a:pPr>
+            <a:r>
+              <a:rPr lang="de-DE" sz="1600" dirty="0" smtClean="0"/>
+              <a:t>„</a:t>
+            </a:r>
+            <a:r>
+              <a:rPr lang="de-DE" sz="1600" dirty="0" err="1" smtClean="0"/>
+              <a:t>arraySum</a:t>
+            </a:r>
+            <a:r>
+              <a:rPr lang="de-DE" sz="1600" dirty="0" smtClean="0"/>
+              <a:t>“		Akzeptiert ein Array von Ganzzahlen als Parameter und gibt die 				Summe aller Zahlen im Array zurück</a:t>
+            </a:r>
+          </a:p>
+          <a:p>
+            <a:pPr marL="800100" lvl="1" indent="-342900">
+              <a:buFont typeface="+mj-lt"/>
+              <a:buAutoNum type="alphaLcPeriod"/>
+            </a:pPr>
+            <a:r>
+              <a:rPr lang="de-DE" sz="1600" dirty="0" smtClean="0"/>
+              <a:t>„</a:t>
+            </a:r>
+            <a:r>
+              <a:rPr lang="de-DE" sz="1600" dirty="0" err="1" smtClean="0"/>
+              <a:t>arraySort</a:t>
+            </a:r>
+            <a:r>
+              <a:rPr lang="de-DE" sz="1600" dirty="0" smtClean="0"/>
+              <a:t>“		Akzeptiert ein Array von Ganzzahlen als Parameter und gibt ein 				Array von Ganzzahlen zurück, welches die gleichen Zahlen in 				aufsteigender Reihenfolge enthält</a:t>
+            </a:r>
+          </a:p>
+          <a:p>
+            <a:pPr marL="800100" lvl="1" indent="-342900">
+              <a:buFont typeface="+mj-lt"/>
+              <a:buAutoNum type="alphaLcPeriod"/>
+            </a:pPr>
+            <a:r>
+              <a:rPr lang="de-DE" sz="1600" dirty="0" smtClean="0"/>
+              <a:t>„</a:t>
+            </a:r>
+            <a:r>
+              <a:rPr lang="de-DE" sz="1600" dirty="0" err="1" smtClean="0"/>
+              <a:t>getWords</a:t>
+            </a:r>
+            <a:r>
+              <a:rPr lang="de-DE" sz="1600" dirty="0" smtClean="0"/>
+              <a:t>“		Akzeptiert einen String und gibt ein String-Array zurück, welches 				die einzelnen Worte enthält (Worte werden durch Leerzeichen 				getrennt).</a:t>
+            </a:r>
+          </a:p>
+          <a:p>
+            <a:pPr marL="400050"/>
+            <a:endParaRPr lang="de-DE" sz="2000" dirty="0"/>
+          </a:p>
+          <a:p>
+            <a:pPr marL="400050"/>
+            <a:r>
+              <a:rPr lang="de-DE" sz="2000" dirty="0" smtClean="0"/>
+              <a:t>Testet eure Methoden in der Main-Klasse, und gebt die Resultate in der Konsole aus!</a:t>
+            </a:r>
           </a:p>
         </p:txBody>
       </p:sp>
@@ -26235,12 +26512,60 @@
           <a:lstStyle/>
           <a:p>
             <a:r>
-              <a:rPr lang="de-DE" smtClean="0">
+              <a:rPr lang="de-DE" dirty="0" smtClean="0">
                 <a:solidFill>
                   <a:srgbClr val="831420"/>
                 </a:solidFill>
               </a:rPr>
               <a:t>Projekt: </a:t>
+            </a:r>
+            <a:r>
+              <a:rPr lang="de-DE" dirty="0" smtClean="0">
+                <a:solidFill>
+                  <a:srgbClr val="831420"/>
+                </a:solidFill>
+              </a:rPr>
+              <a:t>such </a:t>
+            </a:r>
+            <a:r>
+              <a:rPr lang="de-DE" dirty="0" err="1" smtClean="0">
+                <a:solidFill>
+                  <a:srgbClr val="831420"/>
+                </a:solidFill>
+              </a:rPr>
+              <a:t>name</a:t>
+            </a:r>
+            <a:r>
+              <a:rPr lang="de-DE" dirty="0" smtClean="0">
+                <a:solidFill>
+                  <a:srgbClr val="831420"/>
+                </a:solidFill>
+              </a:rPr>
+              <a:t>, </a:t>
+            </a:r>
+            <a:r>
+              <a:rPr lang="de-DE" dirty="0" err="1" smtClean="0">
+                <a:solidFill>
+                  <a:srgbClr val="831420"/>
+                </a:solidFill>
+              </a:rPr>
+              <a:t>many</a:t>
+            </a:r>
+            <a:r>
+              <a:rPr lang="de-DE" dirty="0" smtClean="0">
+                <a:solidFill>
+                  <a:srgbClr val="831420"/>
+                </a:solidFill>
+              </a:rPr>
+              <a:t> </a:t>
+            </a:r>
+            <a:r>
+              <a:rPr lang="de-DE" dirty="0" err="1" smtClean="0">
+                <a:solidFill>
+                  <a:srgbClr val="831420"/>
+                </a:solidFill>
+              </a:rPr>
+              <a:t>fancy</a:t>
             </a:r>
             <a:endParaRPr lang="de-DE" dirty="0">
               <a:solidFill>
@@ -26273,10 +26598,66 @@
           <a:bodyPr anchor="t"/>
           <a:lstStyle/>
           <a:p>
+            <a:r>
+              <a:rPr lang="de-DE" sz="2000" dirty="0" smtClean="0"/>
+              <a:t>so </a:t>
+            </a:r>
+            <a:r>
+              <a:rPr lang="de-DE" sz="2000" dirty="0" err="1" smtClean="0"/>
+              <a:t>description</a:t>
+            </a:r>
             <a:endParaRPr lang="de-DE" sz="2000" dirty="0" smtClean="0"/>
           </a:p>
+          <a:p>
+            <a:r>
+              <a:rPr lang="de-DE" sz="2000" dirty="0" smtClean="0"/>
+              <a:t>wow</a:t>
+            </a:r>
+            <a:endParaRPr lang="de-DE" sz="2000" dirty="0" smtClean="0"/>
+          </a:p>
         </p:txBody>
       </p:sp>
+      <p:pic>
+        <p:nvPicPr>
+          <p:cNvPr id="1028" name="Picture 4" descr="Image result for doge"/>
+          <p:cNvPicPr>
+            <a:picLocks noChangeAspect="1" noChangeArrowheads="1"/>
+          </p:cNvPicPr>
+          <p:nvPr/>
+        </p:nvPicPr>
+        <p:blipFill>
+          <a:blip r:embed="rId3">
+            <a:extLst>
+              <a:ext uri="{28A0092B-C50C-407E-A947-70E740481C1C}">
+                <a14:useLocalDpi xmlns:a14="http://schemas.microsoft.com/office/drawing/2010/main" val="0"/>
+              </a:ext>
+            </a:extLst>
+          </a:blip>
+          <a:srcRect/>
+          <a:stretch>
+            <a:fillRect/>
+          </a:stretch>
+        </p:blipFill>
+        <p:spPr bwMode="auto">
+          <a:xfrm>
+            <a:off x="4031940" y="1453344"/>
+            <a:ext cx="3335286" cy="3285599"/>
+          </a:xfrm>
+          <a:prstGeom prst="rect">
+            <a:avLst/>
+          </a:prstGeom>
+          <a:noFill/>
+          <a:extLst>
+            <a:ext uri="{909E8E84-426E-40DD-AFC4-6F175D3DCCD1}">
+              <a14:hiddenFill xmlns:a14="http://schemas.microsoft.com/office/drawing/2010/main">
+                <a:solidFill>
+                  <a:srgbClr val="FFFFFF"/>
+                </a:solidFill>
+              </a14:hiddenFill>
+            </a:ext>
+          </a:extLst>
+        </p:spPr>
+      </p:pic>
     </p:spTree>
     <p:extLst>
       <p:ext uri="{BB962C8B-B14F-4D97-AF65-F5344CB8AC3E}">

</xml_diff>

<commit_message>
Added labyrinth project excercise with NAO at the end of the presentation
</commit_message>
<xml_diff>
--- a/Präsentationen/Anfänger - Java mit NAO.pptx
+++ b/Präsentationen/Anfänger - Java mit NAO.pptx
@@ -262,7 +262,7 @@
           <a:p>
             <a:fld id="{CC55654B-D41D-4425-B58F-55C2DEAC0691}" type="datetimeFigureOut">
               <a:rPr lang="de-DE" smtClean="0"/>
-              <a:t>23.06.2017</a:t>
+              <a:t>25.01.2018</a:t>
             </a:fld>
             <a:endParaRPr lang="de-DE"/>
           </a:p>
@@ -4264,9 +4264,6 @@
               </a:rPr>
               <a:t>-Statement abbricht, und wie man Methoden mit Parametern korrekt aufruft.</a:t>
             </a:r>
-            <a:endParaRPr lang="de-DE" i="0" u="none" baseline="0" dirty="0" smtClean="0">
-              <a:sym typeface="Wingdings" panose="05000000000000000000" pitchFamily="2" charset="2"/>
-            </a:endParaRPr>
           </a:p>
         </p:txBody>
       </p:sp>
@@ -6607,7 +6604,7 @@
           <a:p>
             <a:fld id="{82DEAF87-53B6-4B16-83D2-2F0231427512}" type="datetimeFigureOut">
               <a:rPr lang="de-DE" smtClean="0"/>
-              <a:t>23.06.2017</a:t>
+              <a:t>25.01.2018</a:t>
             </a:fld>
             <a:endParaRPr lang="de-DE"/>
           </a:p>
@@ -6824,7 +6821,7 @@
           <a:p>
             <a:fld id="{82DEAF87-53B6-4B16-83D2-2F0231427512}" type="datetimeFigureOut">
               <a:rPr lang="de-DE" smtClean="0"/>
-              <a:t>23.06.2017</a:t>
+              <a:t>25.01.2018</a:t>
             </a:fld>
             <a:endParaRPr lang="de-DE"/>
           </a:p>
@@ -7034,7 +7031,7 @@
           <a:p>
             <a:fld id="{82DEAF87-53B6-4B16-83D2-2F0231427512}" type="datetimeFigureOut">
               <a:rPr lang="de-DE" smtClean="0"/>
-              <a:t>23.06.2017</a:t>
+              <a:t>25.01.2018</a:t>
             </a:fld>
             <a:endParaRPr lang="de-DE"/>
           </a:p>
@@ -7310,7 +7307,7 @@
           <a:p>
             <a:fld id="{82DEAF87-53B6-4B16-83D2-2F0231427512}" type="datetimeFigureOut">
               <a:rPr lang="de-DE" smtClean="0"/>
-              <a:t>23.06.2017</a:t>
+              <a:t>25.01.2018</a:t>
             </a:fld>
             <a:endParaRPr lang="de-DE"/>
           </a:p>
@@ -7593,7 +7590,7 @@
           <a:p>
             <a:fld id="{82DEAF87-53B6-4B16-83D2-2F0231427512}" type="datetimeFigureOut">
               <a:rPr lang="de-DE" smtClean="0"/>
-              <a:t>23.06.2017</a:t>
+              <a:t>25.01.2018</a:t>
             </a:fld>
             <a:endParaRPr lang="de-DE"/>
           </a:p>
@@ -7919,7 +7916,7 @@
           <a:p>
             <a:fld id="{82DEAF87-53B6-4B16-83D2-2F0231427512}" type="datetimeFigureOut">
               <a:rPr lang="de-DE" smtClean="0"/>
-              <a:t>23.06.2017</a:t>
+              <a:t>25.01.2018</a:t>
             </a:fld>
             <a:endParaRPr lang="de-DE"/>
           </a:p>
@@ -8385,7 +8382,7 @@
           <a:p>
             <a:fld id="{82DEAF87-53B6-4B16-83D2-2F0231427512}" type="datetimeFigureOut">
               <a:rPr lang="de-DE" smtClean="0"/>
-              <a:t>23.06.2017</a:t>
+              <a:t>25.01.2018</a:t>
             </a:fld>
             <a:endParaRPr lang="de-DE"/>
           </a:p>
@@ -8535,7 +8532,7 @@
           <a:p>
             <a:fld id="{82DEAF87-53B6-4B16-83D2-2F0231427512}" type="datetimeFigureOut">
               <a:rPr lang="de-DE" smtClean="0"/>
-              <a:t>23.06.2017</a:t>
+              <a:t>25.01.2018</a:t>
             </a:fld>
             <a:endParaRPr lang="de-DE"/>
           </a:p>
@@ -8654,7 +8651,7 @@
           <a:p>
             <a:fld id="{82DEAF87-53B6-4B16-83D2-2F0231427512}" type="datetimeFigureOut">
               <a:rPr lang="de-DE" smtClean="0"/>
-              <a:t>23.06.2017</a:t>
+              <a:t>25.01.2018</a:t>
             </a:fld>
             <a:endParaRPr lang="de-DE"/>
           </a:p>
@@ -8964,7 +8961,7 @@
           <a:p>
             <a:fld id="{82DEAF87-53B6-4B16-83D2-2F0231427512}" type="datetimeFigureOut">
               <a:rPr lang="de-DE" smtClean="0"/>
-              <a:t>23.06.2017</a:t>
+              <a:t>25.01.2018</a:t>
             </a:fld>
             <a:endParaRPr lang="de-DE"/>
           </a:p>
@@ -9250,7 +9247,7 @@
           <a:p>
             <a:fld id="{82DEAF87-53B6-4B16-83D2-2F0231427512}" type="datetimeFigureOut">
               <a:rPr lang="de-DE" smtClean="0"/>
-              <a:t>23.06.2017</a:t>
+              <a:t>25.01.2018</a:t>
             </a:fld>
             <a:endParaRPr lang="de-DE"/>
           </a:p>
@@ -17248,11 +17245,7 @@
           <a:p>
             <a:r>
               <a:rPr lang="de-DE" sz="2000" dirty="0" smtClean="0"/>
-              <a:t>Die </a:t>
-            </a:r>
-            <a:r>
-              <a:rPr lang="de-DE" sz="2000" dirty="0" smtClean="0"/>
-              <a:t>Initialisierung wird ein einziges Mal ausgeführt</a:t>
+              <a:t>Die Initialisierung wird ein einziges Mal ausgeführt</a:t>
             </a:r>
             <a:br>
               <a:rPr lang="de-DE" sz="2000" dirty="0" smtClean="0"/>
@@ -23796,22 +23789,14 @@
           <a:p>
             <a:r>
               <a:rPr lang="de-DE" sz="2000" dirty="0" smtClean="0"/>
-              <a:t>Vergleich </a:t>
-            </a:r>
-            <a:r>
-              <a:rPr lang="de-DE" sz="2000" dirty="0" smtClean="0"/>
-              <a:t>von Deklarationen und Initialisierungen:</a:t>
+              <a:t>Vergleich von Deklarationen und Initialisierungen:</a:t>
             </a:r>
             <a:br>
               <a:rPr lang="de-DE" sz="2000" dirty="0" smtClean="0"/>
             </a:br>
             <a:r>
               <a:rPr lang="de-DE" sz="2000" dirty="0" smtClean="0"/>
-              <a:t>	Variablen VS </a:t>
-            </a:r>
-            <a:r>
-              <a:rPr lang="de-DE" sz="2000" dirty="0" smtClean="0"/>
-              <a:t>Objekte</a:t>
+              <a:t>	Variablen VS Objekte</a:t>
             </a:r>
           </a:p>
           <a:p>
@@ -24310,11 +24295,7 @@
             </a:br>
             <a:r>
               <a:rPr lang="de-DE" sz="2000" dirty="0" smtClean="0"/>
-              <a:t> (Stücke Code die man gezielt ausführen kann</a:t>
-            </a:r>
-            <a:r>
-              <a:rPr lang="de-DE" sz="2000" dirty="0" smtClean="0"/>
-              <a:t>)</a:t>
+              <a:t> (Stücke Code die man gezielt ausführen kann)</a:t>
             </a:r>
             <a:r>
               <a:rPr lang="de-DE" sz="2000" u="sng" dirty="0"/>
@@ -24327,7 +24308,6 @@
               <a:rPr lang="de-DE" sz="2000" dirty="0" smtClean="0"/>
               <a:t> (Auch der Konstruktor ist eine Methode)</a:t>
             </a:r>
-            <a:endParaRPr lang="de-DE" sz="2000" dirty="0" smtClean="0"/>
           </a:p>
         </p:txBody>
       </p:sp>
@@ -26157,15 +26137,7 @@
                   <a:srgbClr val="831420"/>
                 </a:solidFill>
               </a:rPr>
-              <a:t>OO: Attribute und </a:t>
-            </a:r>
-            <a:r>
-              <a:rPr lang="de-DE" dirty="0" smtClean="0">
-                <a:solidFill>
-                  <a:srgbClr val="831420"/>
-                </a:solidFill>
-              </a:rPr>
-              <a:t>Methoden: Beispiele</a:t>
+              <a:t>OO: Attribute und Methoden: Beispiele</a:t>
             </a:r>
             <a:endParaRPr lang="de-DE" dirty="0">
               <a:solidFill>
@@ -26978,11 +26950,6 @@
               </a:rPr>
               <a:t>Methoden: Beispiele</a:t>
             </a:r>
-            <a:endParaRPr lang="de-DE" dirty="0">
-              <a:solidFill>
-                <a:srgbClr val="831420"/>
-              </a:solidFill>
-            </a:endParaRPr>
           </a:p>
         </p:txBody>
       </p:sp>
@@ -27013,7 +26980,6 @@
               <a:rPr lang="de-DE" sz="2000" dirty="0" smtClean="0"/>
               <a:t>Was berechnen diese Methoden?</a:t>
             </a:r>
-            <a:endParaRPr lang="de-DE" sz="2000" dirty="0" smtClean="0"/>
           </a:p>
           <a:p>
             <a:endParaRPr lang="de-DE" sz="2000" dirty="0" smtClean="0"/>
@@ -30314,11 +30280,7 @@
             </a:r>
             <a:r>
               <a:rPr lang="de-DE" sz="2000" dirty="0" smtClean="0"/>
-              <a:t> </a:t>
-            </a:r>
-            <a:r>
-              <a:rPr lang="de-DE" sz="2000" dirty="0" smtClean="0"/>
-              <a:t>ist hier ein Array vom Datentyp </a:t>
+              <a:t> ist hier ein Array vom Datentyp </a:t>
             </a:r>
             <a:r>
               <a:rPr lang="de-DE" sz="2000" dirty="0" err="1" smtClean="0">
@@ -31040,17 +31002,8 @@
           <a:p>
             <a:r>
               <a:rPr lang="de-DE" sz="2000" dirty="0" smtClean="0"/>
-              <a:t>In beiden Fällen ist die </a:t>
-            </a:r>
-            <a:r>
-              <a:rPr lang="de-DE" sz="2000" dirty="0" smtClean="0"/>
-              <a:t>Größe des Arrays </a:t>
-            </a:r>
-            <a:r>
-              <a:rPr lang="de-DE" sz="2000" dirty="0" smtClean="0"/>
-              <a:t>von Anfang an fest vorgegeben</a:t>
-            </a:r>
-            <a:endParaRPr lang="de-DE" sz="2000" dirty="0" smtClean="0"/>
+              <a:t>In beiden Fällen ist die Größe des Arrays von Anfang an fest vorgegeben</a:t>
+            </a:r>
           </a:p>
         </p:txBody>
       </p:sp>
@@ -33339,23 +33292,7 @@
             </a:r>
             <a:r>
               <a:rPr lang="de-DE" sz="1600" dirty="0" smtClean="0"/>
-              <a:t>“		Akzeptiert einen String und gibt ein String-Array zurück, welches 				die einzelnen Worte enthält (Worte </a:t>
-            </a:r>
-            <a:r>
-              <a:rPr lang="de-DE" sz="1600" dirty="0" smtClean="0"/>
-              <a:t>in einem String sind </a:t>
-            </a:r>
-            <a:r>
-              <a:rPr lang="de-DE" sz="1600" dirty="0" smtClean="0"/>
-              <a:t>durch </a:t>
-            </a:r>
-            <a:r>
-              <a:rPr lang="de-DE" sz="1600" dirty="0" smtClean="0"/>
-              <a:t>				ein Leerzeichen getrennt</a:t>
-            </a:r>
-            <a:r>
-              <a:rPr lang="de-DE" sz="1600" dirty="0" smtClean="0"/>
-              <a:t>).</a:t>
+              <a:t>“		Akzeptiert einen String und gibt ein String-Array zurück, welches 				die einzelnen Worte enthält (Worte in einem String sind durch 				ein Leerzeichen getrennt).</a:t>
             </a:r>
           </a:p>
           <a:p>
@@ -33607,15 +33544,7 @@
                   <a:srgbClr val="831420"/>
                 </a:solidFill>
               </a:rPr>
-              <a:t>Projekt: such </a:t>
-            </a:r>
-            <a:r>
-              <a:rPr lang="de-DE" dirty="0" err="1" smtClean="0">
-                <a:solidFill>
-                  <a:srgbClr val="831420"/>
-                </a:solidFill>
-              </a:rPr>
-              <a:t>name</a:t>
+              <a:t>Projekt: </a:t>
             </a:r>
             <a:r>
               <a:rPr lang="de-DE" dirty="0" smtClean="0">
@@ -33623,15 +33552,7 @@
                   <a:srgbClr val="831420"/>
                 </a:solidFill>
               </a:rPr>
-              <a:t>, </a:t>
-            </a:r>
-            <a:r>
-              <a:rPr lang="de-DE" dirty="0" err="1" smtClean="0">
-                <a:solidFill>
-                  <a:srgbClr val="831420"/>
-                </a:solidFill>
-              </a:rPr>
-              <a:t>many</a:t>
+              <a:t>Findet aus dem</a:t>
             </a:r>
             <a:r>
               <a:rPr lang="de-DE" dirty="0" smtClean="0">
@@ -33639,15 +33560,7 @@
                   <a:srgbClr val="831420"/>
                 </a:solidFill>
               </a:rPr>
-              <a:t> </a:t>
-            </a:r>
-            <a:r>
-              <a:rPr lang="de-DE" dirty="0" err="1" smtClean="0">
-                <a:solidFill>
-                  <a:srgbClr val="831420"/>
-                </a:solidFill>
-              </a:rPr>
-              <a:t>fancy</a:t>
+              <a:t> Labyrinth</a:t>
             </a:r>
             <a:endParaRPr lang="de-DE" dirty="0">
               <a:solidFill>
@@ -33677,32 +33590,65 @@
           </a:prstGeom>
         </p:spPr>
         <p:txBody>
-          <a:bodyPr anchor="t"/>
+          <a:bodyPr anchor="ctr"/>
           <a:lstStyle/>
           <a:p>
             <a:r>
               <a:rPr lang="de-DE" sz="2000" dirty="0" smtClean="0"/>
-              <a:t>so </a:t>
-            </a:r>
-            <a:r>
-              <a:rPr lang="de-DE" sz="2000" dirty="0" err="1" smtClean="0"/>
-              <a:t>description</a:t>
+              <a:t>Eure Aufgabe ist es den NAO durch ein aufgebautes Labyrinth</a:t>
+            </a:r>
+            <a:br>
+              <a:rPr lang="de-DE" sz="2000" dirty="0" smtClean="0"/>
+            </a:br>
+            <a:r>
+              <a:rPr lang="de-DE" sz="2000" dirty="0" smtClean="0"/>
+              <a:t>zu manövrieren</a:t>
             </a:r>
             <a:endParaRPr lang="de-DE" sz="2000" dirty="0" smtClean="0"/>
           </a:p>
           <a:p>
+            <a:endParaRPr lang="de-DE" sz="2000" dirty="0" smtClean="0"/>
+          </a:p>
+          <a:p>
+            <a:endParaRPr lang="de-DE" sz="2000" dirty="0" smtClean="0"/>
+          </a:p>
+          <a:p>
             <a:r>
               <a:rPr lang="de-DE" sz="2000" dirty="0" smtClean="0"/>
-              <a:t>wow</a:t>
-            </a:r>
+              <a:t>Welche Sensoren eignen sich</a:t>
+            </a:r>
+            <a:br>
+              <a:rPr lang="de-DE" sz="2000" dirty="0" smtClean="0"/>
+            </a:br>
+            <a:r>
+              <a:rPr lang="de-DE" sz="2000" dirty="0" smtClean="0"/>
+              <a:t>um Mauern zu erkennen?</a:t>
+            </a:r>
+          </a:p>
+          <a:p>
+            <a:endParaRPr lang="de-DE" sz="2000" dirty="0"/>
+          </a:p>
+          <a:p>
+            <a:r>
+              <a:rPr lang="de-DE" sz="2000" dirty="0" smtClean="0"/>
+              <a:t>Wie findet man überhaupt</a:t>
+            </a:r>
+            <a:br>
+              <a:rPr lang="de-DE" sz="2000" dirty="0" smtClean="0"/>
+            </a:br>
+            <a:r>
+              <a:rPr lang="de-DE" sz="2000" dirty="0" smtClean="0"/>
+              <a:t>den Ausgang?</a:t>
+            </a:r>
+            <a:endParaRPr lang="de-DE" sz="2000" dirty="0" smtClean="0"/>
           </a:p>
         </p:txBody>
       </p:sp>
       <p:pic>
         <p:nvPicPr>
-          <p:cNvPr id="1028" name="Picture 4" descr="Image result for doge"/>
+          <p:cNvPr id="4" name="Grafik 3"/>
           <p:cNvPicPr>
-            <a:picLocks noChangeAspect="1" noChangeArrowheads="1"/>
+            <a:picLocks noChangeAspect="1"/>
           </p:cNvPicPr>
           <p:nvPr/>
         </p:nvPicPr>
@@ -33714,29 +33660,18 @@
               </a:ext>
             </a:extLst>
           </a:blip>
-          <a:srcRect/>
           <a:stretch>
             <a:fillRect/>
           </a:stretch>
         </p:blipFill>
-        <p:spPr bwMode="auto">
+        <p:spPr>
           <a:xfrm>
-            <a:off x="4031940" y="1453344"/>
-            <a:ext cx="3335286" cy="3285599"/>
+            <a:off x="4115544" y="2506163"/>
+            <a:ext cx="4463988" cy="2259549"/>
           </a:xfrm>
           <a:prstGeom prst="rect">
             <a:avLst/>
           </a:prstGeom>
-          <a:noFill/>
-          <a:extLst>
-            <a:ext uri="{909E8E84-426E-40DD-AFC4-6F175D3DCCD1}">
-              <a14:hiddenFill xmlns:a14="http://schemas.microsoft.com/office/drawing/2010/main">
-                <a:solidFill>
-                  <a:srgbClr val="FFFFFF"/>
-                </a:solidFill>
-              </a14:hiddenFill>
-            </a:ext>
-          </a:extLst>
         </p:spPr>
       </p:pic>
     </p:spTree>
@@ -33888,7 +33823,6 @@
               <a:rPr lang="de-DE" sz="1600" dirty="0" smtClean="0"/>
               <a:t> was man ihnen sagt</a:t>
             </a:r>
-            <a:endParaRPr lang="de-DE" sz="1600" dirty="0" smtClean="0"/>
           </a:p>
           <a:p>
             <a:r>

</xml_diff>